<commit_message>
Fix cases, when dataset doesn't need a imputation. Add new results.
</commit_message>
<xml_diff>
--- a/DOCUMENTS/reprorts_to_supervisor/17.11_results.pptx
+++ b/DOCUMENTS/reprorts_to_supervisor/17.11_results.pptx
@@ -279,7 +279,7 @@
           <a:p>
             <a:fld id="{19870E36-D61B-4B69-8714-AD51F87EBDAB}" type="datetimeFigureOut">
               <a:rPr lang="ru-RU" smtClean="0"/>
-              <a:t>16.11.2021</a:t>
+              <a:t>17.11.2021</a:t>
             </a:fld>
             <a:endParaRPr lang="ru-RU"/>
           </a:p>
@@ -479,7 +479,7 @@
           <a:p>
             <a:fld id="{19870E36-D61B-4B69-8714-AD51F87EBDAB}" type="datetimeFigureOut">
               <a:rPr lang="ru-RU" smtClean="0"/>
-              <a:t>16.11.2021</a:t>
+              <a:t>17.11.2021</a:t>
             </a:fld>
             <a:endParaRPr lang="ru-RU"/>
           </a:p>
@@ -689,7 +689,7 @@
           <a:p>
             <a:fld id="{19870E36-D61B-4B69-8714-AD51F87EBDAB}" type="datetimeFigureOut">
               <a:rPr lang="ru-RU" smtClean="0"/>
-              <a:t>16.11.2021</a:t>
+              <a:t>17.11.2021</a:t>
             </a:fld>
             <a:endParaRPr lang="ru-RU"/>
           </a:p>
@@ -889,7 +889,7 @@
           <a:p>
             <a:fld id="{19870E36-D61B-4B69-8714-AD51F87EBDAB}" type="datetimeFigureOut">
               <a:rPr lang="ru-RU" smtClean="0"/>
-              <a:t>16.11.2021</a:t>
+              <a:t>17.11.2021</a:t>
             </a:fld>
             <a:endParaRPr lang="ru-RU"/>
           </a:p>
@@ -1165,7 +1165,7 @@
           <a:p>
             <a:fld id="{19870E36-D61B-4B69-8714-AD51F87EBDAB}" type="datetimeFigureOut">
               <a:rPr lang="ru-RU" smtClean="0"/>
-              <a:t>16.11.2021</a:t>
+              <a:t>17.11.2021</a:t>
             </a:fld>
             <a:endParaRPr lang="ru-RU"/>
           </a:p>
@@ -1433,7 +1433,7 @@
           <a:p>
             <a:fld id="{19870E36-D61B-4B69-8714-AD51F87EBDAB}" type="datetimeFigureOut">
               <a:rPr lang="ru-RU" smtClean="0"/>
-              <a:t>16.11.2021</a:t>
+              <a:t>17.11.2021</a:t>
             </a:fld>
             <a:endParaRPr lang="ru-RU"/>
           </a:p>
@@ -1848,7 +1848,7 @@
           <a:p>
             <a:fld id="{19870E36-D61B-4B69-8714-AD51F87EBDAB}" type="datetimeFigureOut">
               <a:rPr lang="ru-RU" smtClean="0"/>
-              <a:t>16.11.2021</a:t>
+              <a:t>17.11.2021</a:t>
             </a:fld>
             <a:endParaRPr lang="ru-RU"/>
           </a:p>
@@ -1990,7 +1990,7 @@
           <a:p>
             <a:fld id="{19870E36-D61B-4B69-8714-AD51F87EBDAB}" type="datetimeFigureOut">
               <a:rPr lang="ru-RU" smtClean="0"/>
-              <a:t>16.11.2021</a:t>
+              <a:t>17.11.2021</a:t>
             </a:fld>
             <a:endParaRPr lang="ru-RU"/>
           </a:p>
@@ -2103,7 +2103,7 @@
           <a:p>
             <a:fld id="{19870E36-D61B-4B69-8714-AD51F87EBDAB}" type="datetimeFigureOut">
               <a:rPr lang="ru-RU" smtClean="0"/>
-              <a:t>16.11.2021</a:t>
+              <a:t>17.11.2021</a:t>
             </a:fld>
             <a:endParaRPr lang="ru-RU"/>
           </a:p>
@@ -2416,7 +2416,7 @@
           <a:p>
             <a:fld id="{19870E36-D61B-4B69-8714-AD51F87EBDAB}" type="datetimeFigureOut">
               <a:rPr lang="ru-RU" smtClean="0"/>
-              <a:t>16.11.2021</a:t>
+              <a:t>17.11.2021</a:t>
             </a:fld>
             <a:endParaRPr lang="ru-RU"/>
           </a:p>
@@ -2705,7 +2705,7 @@
           <a:p>
             <a:fld id="{19870E36-D61B-4B69-8714-AD51F87EBDAB}" type="datetimeFigureOut">
               <a:rPr lang="ru-RU" smtClean="0"/>
-              <a:t>16.11.2021</a:t>
+              <a:t>17.11.2021</a:t>
             </a:fld>
             <a:endParaRPr lang="ru-RU"/>
           </a:p>
@@ -2948,7 +2948,7 @@
           <a:p>
             <a:fld id="{19870E36-D61B-4B69-8714-AD51F87EBDAB}" type="datetimeFigureOut">
               <a:rPr lang="ru-RU" smtClean="0"/>
-              <a:t>16.11.2021</a:t>
+              <a:t>17.11.2021</a:t>
             </a:fld>
             <a:endParaRPr lang="ru-RU"/>
           </a:p>
@@ -4746,7 +4746,7 @@
           <a:p>
             <a:r>
               <a:rPr lang="en-US" dirty="0"/>
-              <a:t>Need to add DBSCAN?</a:t>
+              <a:t>DBSCAN?</a:t>
             </a:r>
             <a:endParaRPr lang="ru-RU" dirty="0"/>
           </a:p>

</xml_diff>